<commit_message>
Fixes to Chap 15
Fixes to Chapter 15 and other video additions / typo fixes
</commit_message>
<xml_diff>
--- a/Lecture Slides/2DCentroidDiagrams_diagrams.pptx
+++ b/Lecture Slides/2DCentroidDiagrams_diagrams.pptx
@@ -900,7 +900,7 @@
           <a:p>
             <a:fld id="{EEC40B93-9382-47DD-88EF-EE995B444767}" type="datetimeFigureOut">
               <a:rPr lang="en-US" smtClean="0"/>
-              <a:t>10/5/21</a:t>
+              <a:t>4/7/2022</a:t>
             </a:fld>
             <a:endParaRPr lang="en-US"/>
           </a:p>
@@ -1068,7 +1068,7 @@
           <a:p>
             <a:fld id="{EEC40B93-9382-47DD-88EF-EE995B444767}" type="datetimeFigureOut">
               <a:rPr lang="en-US" smtClean="0"/>
-              <a:t>10/5/21</a:t>
+              <a:t>4/7/2022</a:t>
             </a:fld>
             <a:endParaRPr lang="en-US"/>
           </a:p>
@@ -1246,7 +1246,7 @@
           <a:p>
             <a:fld id="{EEC40B93-9382-47DD-88EF-EE995B444767}" type="datetimeFigureOut">
               <a:rPr lang="en-US" smtClean="0"/>
-              <a:t>10/5/21</a:t>
+              <a:t>4/7/2022</a:t>
             </a:fld>
             <a:endParaRPr lang="en-US"/>
           </a:p>
@@ -1414,7 +1414,7 @@
           <a:p>
             <a:fld id="{EEC40B93-9382-47DD-88EF-EE995B444767}" type="datetimeFigureOut">
               <a:rPr lang="en-US" smtClean="0"/>
-              <a:t>10/5/21</a:t>
+              <a:t>4/7/2022</a:t>
             </a:fld>
             <a:endParaRPr lang="en-US"/>
           </a:p>
@@ -1659,7 +1659,7 @@
           <a:p>
             <a:fld id="{EEC40B93-9382-47DD-88EF-EE995B444767}" type="datetimeFigureOut">
               <a:rPr lang="en-US" smtClean="0"/>
-              <a:t>10/5/21</a:t>
+              <a:t>4/7/2022</a:t>
             </a:fld>
             <a:endParaRPr lang="en-US"/>
           </a:p>
@@ -1944,7 +1944,7 @@
           <a:p>
             <a:fld id="{EEC40B93-9382-47DD-88EF-EE995B444767}" type="datetimeFigureOut">
               <a:rPr lang="en-US" smtClean="0"/>
-              <a:t>10/5/21</a:t>
+              <a:t>4/7/2022</a:t>
             </a:fld>
             <a:endParaRPr lang="en-US"/>
           </a:p>
@@ -2363,7 +2363,7 @@
           <a:p>
             <a:fld id="{EEC40B93-9382-47DD-88EF-EE995B444767}" type="datetimeFigureOut">
               <a:rPr lang="en-US" smtClean="0"/>
-              <a:t>10/5/21</a:t>
+              <a:t>4/7/2022</a:t>
             </a:fld>
             <a:endParaRPr lang="en-US"/>
           </a:p>
@@ -2480,7 +2480,7 @@
           <a:p>
             <a:fld id="{EEC40B93-9382-47DD-88EF-EE995B444767}" type="datetimeFigureOut">
               <a:rPr lang="en-US" smtClean="0"/>
-              <a:t>10/5/21</a:t>
+              <a:t>4/7/2022</a:t>
             </a:fld>
             <a:endParaRPr lang="en-US"/>
           </a:p>
@@ -2575,7 +2575,7 @@
           <a:p>
             <a:fld id="{EEC40B93-9382-47DD-88EF-EE995B444767}" type="datetimeFigureOut">
               <a:rPr lang="en-US" smtClean="0"/>
-              <a:t>10/5/21</a:t>
+              <a:t>4/7/2022</a:t>
             </a:fld>
             <a:endParaRPr lang="en-US"/>
           </a:p>
@@ -2850,7 +2850,7 @@
           <a:p>
             <a:fld id="{EEC40B93-9382-47DD-88EF-EE995B444767}" type="datetimeFigureOut">
               <a:rPr lang="en-US" smtClean="0"/>
-              <a:t>10/5/21</a:t>
+              <a:t>4/7/2022</a:t>
             </a:fld>
             <a:endParaRPr lang="en-US"/>
           </a:p>
@@ -3102,7 +3102,7 @@
           <a:p>
             <a:fld id="{EEC40B93-9382-47DD-88EF-EE995B444767}" type="datetimeFigureOut">
               <a:rPr lang="en-US" smtClean="0"/>
-              <a:t>10/5/21</a:t>
+              <a:t>4/7/2022</a:t>
             </a:fld>
             <a:endParaRPr lang="en-US"/>
           </a:p>
@@ -3313,7 +3313,7 @@
           <a:p>
             <a:fld id="{EEC40B93-9382-47DD-88EF-EE995B444767}" type="datetimeFigureOut">
               <a:rPr lang="en-US" smtClean="0"/>
-              <a:t>10/5/21</a:t>
+              <a:t>4/7/2022</a:t>
             </a:fld>
             <a:endParaRPr lang="en-US"/>
           </a:p>
@@ -4268,7 +4268,7 @@
         <p:spPr>
           <a:xfrm>
             <a:off x="6390833" y="3410588"/>
-            <a:ext cx="365806" cy="369332"/>
+            <a:ext cx="311304" cy="369332"/>
           </a:xfrm>
           <a:prstGeom prst="rect">
             <a:avLst/>
@@ -4283,7 +4283,7 @@
           <a:p>
             <a:r>
               <a:rPr lang="en-US" b="1" dirty="0"/>
-              <a:t>X’</a:t>
+              <a:t>X</a:t>
             </a:r>
           </a:p>
         </p:txBody>
@@ -4357,8 +4357,8 @@
           </a:p>
         </p:txBody>
       </p:sp>
-      <mc:AlternateContent xmlns:mc="http://schemas.openxmlformats.org/markup-compatibility/2006">
-        <mc:Choice xmlns:a14="http://schemas.microsoft.com/office/drawing/2010/main" Requires="a14">
+      <mc:AlternateContent xmlns:mc="http://schemas.openxmlformats.org/markup-compatibility/2006" xmlns:a14="http://schemas.microsoft.com/office/drawing/2010/main">
+        <mc:Choice Requires="a14">
           <p:sp>
             <p:nvSpPr>
               <p:cNvPr id="31" name="TextBox 30"/>
@@ -4412,7 +4412,7 @@
             </p:txBody>
           </p:sp>
         </mc:Choice>
-        <mc:Fallback>
+        <mc:Fallback xmlns="">
           <p:sp>
             <p:nvSpPr>
               <p:cNvPr id="31" name="TextBox 30"/>
@@ -4562,8 +4562,8 @@
           </p:style>
         </p:cxnSp>
       </p:grpSp>
-      <mc:AlternateContent xmlns:mc="http://schemas.openxmlformats.org/markup-compatibility/2006">
-        <mc:Choice xmlns:a14="http://schemas.microsoft.com/office/drawing/2010/main" Requires="a14">
+      <mc:AlternateContent xmlns:mc="http://schemas.openxmlformats.org/markup-compatibility/2006" xmlns:a14="http://schemas.microsoft.com/office/drawing/2010/main">
+        <mc:Choice Requires="a14">
           <p:sp>
             <p:nvSpPr>
               <p:cNvPr id="24" name="TextBox 23"/>
@@ -4699,7 +4699,7 @@
             </p:txBody>
           </p:sp>
         </mc:Choice>
-        <mc:Fallback>
+        <mc:Fallback xmlns="">
           <p:sp>
             <p:nvSpPr>
               <p:cNvPr id="24" name="TextBox 23"/>
@@ -4875,8 +4875,8 @@
           </a:p>
         </p:txBody>
       </p:sp>
-      <mc:AlternateContent xmlns:mc="http://schemas.openxmlformats.org/markup-compatibility/2006">
-        <mc:Choice xmlns:a14="http://schemas.microsoft.com/office/drawing/2010/main" Requires="a14">
+      <mc:AlternateContent xmlns:mc="http://schemas.openxmlformats.org/markup-compatibility/2006" xmlns:a14="http://schemas.microsoft.com/office/drawing/2010/main">
+        <mc:Choice Requires="a14">
           <p:sp>
             <p:nvSpPr>
               <p:cNvPr id="34" name="TextBox 33">
@@ -4936,7 +4936,7 @@
             </p:txBody>
           </p:sp>
         </mc:Choice>
-        <mc:Fallback>
+        <mc:Fallback xmlns="">
           <p:sp>
             <p:nvSpPr>
               <p:cNvPr id="34" name="TextBox 33">
@@ -4981,8 +4981,8 @@
           </p:sp>
         </mc:Fallback>
       </mc:AlternateContent>
-      <mc:AlternateContent xmlns:mc="http://schemas.openxmlformats.org/markup-compatibility/2006">
-        <mc:Choice xmlns:a14="http://schemas.microsoft.com/office/drawing/2010/main" Requires="a14">
+      <mc:AlternateContent xmlns:mc="http://schemas.openxmlformats.org/markup-compatibility/2006" xmlns:a14="http://schemas.microsoft.com/office/drawing/2010/main">
+        <mc:Choice Requires="a14">
           <p:sp>
             <p:nvSpPr>
               <p:cNvPr id="35" name="TextBox 34">
@@ -5042,7 +5042,7 @@
             </p:txBody>
           </p:sp>
         </mc:Choice>
-        <mc:Fallback>
+        <mc:Fallback xmlns="">
           <p:sp>
             <p:nvSpPr>
               <p:cNvPr id="35" name="TextBox 34">
@@ -5684,8 +5684,8 @@
           </a:fontRef>
         </p:style>
       </p:cxnSp>
-      <mc:AlternateContent xmlns:mc="http://schemas.openxmlformats.org/markup-compatibility/2006">
-        <mc:Choice xmlns:a14="http://schemas.microsoft.com/office/drawing/2010/main" Requires="a14">
+      <mc:AlternateContent xmlns:mc="http://schemas.openxmlformats.org/markup-compatibility/2006" xmlns:a14="http://schemas.microsoft.com/office/drawing/2010/main">
+        <mc:Choice Requires="a14">
           <p:sp>
             <p:nvSpPr>
               <p:cNvPr id="21" name="TextBox 20"/>
@@ -5779,7 +5779,7 @@
             </p:txBody>
           </p:sp>
         </mc:Choice>
-        <mc:Fallback>
+        <mc:Fallback xmlns="">
           <p:sp>
             <p:nvSpPr>
               <p:cNvPr id="21" name="TextBox 20"/>
@@ -6246,8 +6246,8 @@
           </a:fontRef>
         </p:style>
       </p:cxnSp>
-      <mc:AlternateContent xmlns:mc="http://schemas.openxmlformats.org/markup-compatibility/2006">
-        <mc:Choice xmlns:a14="http://schemas.microsoft.com/office/drawing/2010/main" Requires="a14">
+      <mc:AlternateContent xmlns:mc="http://schemas.openxmlformats.org/markup-compatibility/2006" xmlns:a14="http://schemas.microsoft.com/office/drawing/2010/main">
+        <mc:Choice Requires="a14">
           <p:sp>
             <p:nvSpPr>
               <p:cNvPr id="31" name="TextBox 30"/>
@@ -6301,7 +6301,7 @@
             </p:txBody>
           </p:sp>
         </mc:Choice>
-        <mc:Fallback>
+        <mc:Fallback xmlns="">
           <p:sp>
             <p:nvSpPr>
               <p:cNvPr id="31" name="TextBox 30"/>
@@ -6549,8 +6549,8 @@
           </p:style>
         </p:cxnSp>
       </p:grpSp>
-      <mc:AlternateContent xmlns:mc="http://schemas.openxmlformats.org/markup-compatibility/2006">
-        <mc:Choice xmlns:a14="http://schemas.microsoft.com/office/drawing/2010/main" Requires="a14">
+      <mc:AlternateContent xmlns:mc="http://schemas.openxmlformats.org/markup-compatibility/2006" xmlns:a14="http://schemas.microsoft.com/office/drawing/2010/main">
+        <mc:Choice Requires="a14">
           <p:sp>
             <p:nvSpPr>
               <p:cNvPr id="24" name="TextBox 23"/>
@@ -6644,7 +6644,7 @@
             </p:txBody>
           </p:sp>
         </mc:Choice>
-        <mc:Fallback>
+        <mc:Fallback xmlns="">
           <p:sp>
             <p:nvSpPr>
               <p:cNvPr id="24" name="TextBox 23"/>
@@ -6848,8 +6848,8 @@
           </a:p>
         </p:txBody>
       </p:sp>
-      <mc:AlternateContent xmlns:mc="http://schemas.openxmlformats.org/markup-compatibility/2006">
-        <mc:Choice xmlns:a14="http://schemas.microsoft.com/office/drawing/2010/main" Requires="a14">
+      <mc:AlternateContent xmlns:mc="http://schemas.openxmlformats.org/markup-compatibility/2006" xmlns:a14="http://schemas.microsoft.com/office/drawing/2010/main">
+        <mc:Choice Requires="a14">
           <p:sp>
             <p:nvSpPr>
               <p:cNvPr id="33" name="TextBox 32">
@@ -6949,7 +6949,7 @@
             </p:txBody>
           </p:sp>
         </mc:Choice>
-        <mc:Fallback>
+        <mc:Fallback xmlns="">
           <p:sp>
             <p:nvSpPr>
               <p:cNvPr id="33" name="TextBox 32">
@@ -7289,8 +7289,8 @@
           </a:p>
         </p:txBody>
       </p:sp>
-      <mc:AlternateContent xmlns:mc="http://schemas.openxmlformats.org/markup-compatibility/2006">
-        <mc:Choice xmlns:a14="http://schemas.microsoft.com/office/drawing/2010/main" Requires="a14">
+      <mc:AlternateContent xmlns:mc="http://schemas.openxmlformats.org/markup-compatibility/2006" xmlns:a14="http://schemas.microsoft.com/office/drawing/2010/main">
+        <mc:Choice Requires="a14">
           <p:sp>
             <p:nvSpPr>
               <p:cNvPr id="31" name="TextBox 30"/>
@@ -7344,7 +7344,7 @@
             </p:txBody>
           </p:sp>
         </mc:Choice>
-        <mc:Fallback>
+        <mc:Fallback xmlns="">
           <p:sp>
             <p:nvSpPr>
               <p:cNvPr id="31" name="TextBox 30"/>
@@ -7494,8 +7494,8 @@
           </p:style>
         </p:cxnSp>
       </p:grpSp>
-      <mc:AlternateContent xmlns:mc="http://schemas.openxmlformats.org/markup-compatibility/2006">
-        <mc:Choice xmlns:a14="http://schemas.microsoft.com/office/drawing/2010/main" Requires="a14">
+      <mc:AlternateContent xmlns:mc="http://schemas.openxmlformats.org/markup-compatibility/2006" xmlns:a14="http://schemas.microsoft.com/office/drawing/2010/main">
+        <mc:Choice Requires="a14">
           <p:sp>
             <p:nvSpPr>
               <p:cNvPr id="24" name="TextBox 23"/>
@@ -7597,7 +7597,7 @@
             </p:txBody>
           </p:sp>
         </mc:Choice>
-        <mc:Fallback>
+        <mc:Fallback xmlns="">
           <p:sp>
             <p:nvSpPr>
               <p:cNvPr id="24" name="TextBox 23"/>
@@ -7773,8 +7773,8 @@
           </a:p>
         </p:txBody>
       </p:sp>
-      <mc:AlternateContent xmlns:mc="http://schemas.openxmlformats.org/markup-compatibility/2006">
-        <mc:Choice xmlns:a14="http://schemas.microsoft.com/office/drawing/2010/main" Requires="a14">
+      <mc:AlternateContent xmlns:mc="http://schemas.openxmlformats.org/markup-compatibility/2006" xmlns:a14="http://schemas.microsoft.com/office/drawing/2010/main">
+        <mc:Choice Requires="a14">
           <p:sp>
             <p:nvSpPr>
               <p:cNvPr id="34" name="TextBox 33">
@@ -7834,7 +7834,7 @@
             </p:txBody>
           </p:sp>
         </mc:Choice>
-        <mc:Fallback>
+        <mc:Fallback xmlns="">
           <p:sp>
             <p:nvSpPr>
               <p:cNvPr id="34" name="TextBox 33">
@@ -7879,8 +7879,8 @@
           </p:sp>
         </mc:Fallback>
       </mc:AlternateContent>
-      <mc:AlternateContent xmlns:mc="http://schemas.openxmlformats.org/markup-compatibility/2006">
-        <mc:Choice xmlns:a14="http://schemas.microsoft.com/office/drawing/2010/main" Requires="a14">
+      <mc:AlternateContent xmlns:mc="http://schemas.openxmlformats.org/markup-compatibility/2006" xmlns:a14="http://schemas.microsoft.com/office/drawing/2010/main">
+        <mc:Choice Requires="a14">
           <p:sp>
             <p:nvSpPr>
               <p:cNvPr id="35" name="TextBox 34">
@@ -7940,7 +7940,7 @@
             </p:txBody>
           </p:sp>
         </mc:Choice>
-        <mc:Fallback>
+        <mc:Fallback xmlns="">
           <p:sp>
             <p:nvSpPr>
               <p:cNvPr id="35" name="TextBox 34">
@@ -8809,8 +8809,8 @@
           </a:p>
         </p:txBody>
       </p:sp>
-      <mc:AlternateContent xmlns:mc="http://schemas.openxmlformats.org/markup-compatibility/2006">
-        <mc:Choice xmlns:a14="http://schemas.microsoft.com/office/drawing/2010/main" Requires="a14">
+      <mc:AlternateContent xmlns:mc="http://schemas.openxmlformats.org/markup-compatibility/2006" xmlns:a14="http://schemas.microsoft.com/office/drawing/2010/main">
+        <mc:Choice Requires="a14">
           <p:sp>
             <p:nvSpPr>
               <p:cNvPr id="31" name="TextBox 30"/>
@@ -8861,7 +8861,7 @@
             </p:txBody>
           </p:sp>
         </mc:Choice>
-        <mc:Fallback>
+        <mc:Fallback xmlns="">
           <p:sp>
             <p:nvSpPr>
               <p:cNvPr id="31" name="TextBox 30"/>
@@ -8900,8 +8900,8 @@
           </p:sp>
         </mc:Fallback>
       </mc:AlternateContent>
-      <mc:AlternateContent xmlns:mc="http://schemas.openxmlformats.org/markup-compatibility/2006">
-        <mc:Choice xmlns:a14="http://schemas.microsoft.com/office/drawing/2010/main" Requires="a14">
+      <mc:AlternateContent xmlns:mc="http://schemas.openxmlformats.org/markup-compatibility/2006" xmlns:a14="http://schemas.microsoft.com/office/drawing/2010/main">
+        <mc:Choice Requires="a14">
           <p:sp>
             <p:nvSpPr>
               <p:cNvPr id="21" name="TextBox 20"/>
@@ -8954,7 +8954,7 @@
             </p:txBody>
           </p:sp>
         </mc:Choice>
-        <mc:Fallback>
+        <mc:Fallback xmlns="">
           <p:sp>
             <p:nvSpPr>
               <p:cNvPr id="21" name="TextBox 20"/>
@@ -9498,8 +9498,8 @@
           </p:style>
         </p:cxnSp>
       </p:grpSp>
-      <mc:AlternateContent xmlns:mc="http://schemas.openxmlformats.org/markup-compatibility/2006">
-        <mc:Choice xmlns:a14="http://schemas.microsoft.com/office/drawing/2010/main" Requires="a14">
+      <mc:AlternateContent xmlns:mc="http://schemas.openxmlformats.org/markup-compatibility/2006" xmlns:a14="http://schemas.microsoft.com/office/drawing/2010/main">
+        <mc:Choice Requires="a14">
           <p:sp>
             <p:nvSpPr>
               <p:cNvPr id="37" name="TextBox 36">
@@ -9592,7 +9592,7 @@
             </p:txBody>
           </p:sp>
         </mc:Choice>
-        <mc:Fallback>
+        <mc:Fallback xmlns="">
           <p:sp>
             <p:nvSpPr>
               <p:cNvPr id="37" name="TextBox 36">
@@ -12988,7 +12988,7 @@
         <p:spPr>
           <a:xfrm>
             <a:off x="5750976" y="3723225"/>
-            <a:ext cx="304892" cy="369332"/>
+            <a:ext cx="311304" cy="369332"/>
           </a:xfrm>
           <a:prstGeom prst="rect">
             <a:avLst/>
@@ -13006,7 +13006,7 @@
           <a:p>
             <a:r>
               <a:rPr lang="en-US" b="1" dirty="0"/>
-              <a:t>Y</a:t>
+              <a:t>X</a:t>
             </a:r>
           </a:p>
         </p:txBody>

</xml_diff>